<commit_message>
add set_dblstrike and copy_table_value and modify report structure
</commit_message>
<xml_diff>
--- a/pptx/result/dbl_table.pptx
+++ b/pptx/result/dbl_table.pptx
@@ -36,7 +36,7 @@
             <a:spLocks noGrp="1"/>
           </p:cNvSpPr>
           <p:nvPr>
-            <p:ph type="ftr" idx="2"/>
+            <p:ph type="ftr" idx="1"/>
           </p:nvPr>
         </p:nvSpPr>
         <p:spPr/>
@@ -56,14 +56,14 @@
             <a:spLocks noGrp="1"/>
           </p:cNvSpPr>
           <p:nvPr>
-            <p:ph type="sldNum" idx="3"/>
+            <p:ph type="sldNum" idx="2"/>
           </p:nvPr>
         </p:nvSpPr>
         <p:spPr/>
         <p:txBody>
           <a:bodyPr/>
           <a:p>
-            <a:fld id="{56EE11D6-31A1-4FAE-AEE0-216B51294C7F}" type="slidenum">
+            <a:fld id="{21EE5989-16D9-4D56-BCB8-7F7F0203E370}" type="slidenum">
               <a:t>&lt;#&gt;</a:t>
             </a:fld>
           </a:p>
@@ -76,7 +76,7 @@
             <a:spLocks noGrp="1"/>
           </p:cNvSpPr>
           <p:nvPr>
-            <p:ph type="dt" idx="1"/>
+            <p:ph type="dt" idx="3"/>
           </p:nvPr>
         </p:nvSpPr>
         <p:spPr/>
@@ -114,7 +114,7 @@
       </p:grpSpPr>
       <p:sp>
         <p:nvSpPr>
-          <p:cNvPr id="26" name="PlaceHolder 1"/>
+          <p:cNvPr id="25" name="PlaceHolder 1"/>
           <p:cNvSpPr>
             <a:spLocks noGrp="1"/>
           </p:cNvSpPr>
@@ -125,7 +125,7 @@
         <p:spPr>
           <a:xfrm>
             <a:off x="685800" y="2130480"/>
-            <a:ext cx="7772040" cy="1469520"/>
+            <a:ext cx="7771680" cy="1469160"/>
           </a:xfrm>
           <a:prstGeom prst="rect">
             <a:avLst/>
@@ -140,18 +140,18 @@
             <a:noAutofit/>
           </a:bodyPr>
           <a:p>
-            <a:endParaRPr b="0" lang="en-US" sz="1800" spc="-1" strike="noStrike">
-              <a:solidFill>
-                <a:srgbClr val="000000"/>
-              </a:solidFill>
-              <a:latin typeface="Calibri"/>
+            <a:pPr algn="ctr">
+              <a:buNone/>
+            </a:pPr>
+            <a:endParaRPr b="0" lang="en-US" sz="4400" spc="-1" strike="noStrike">
+              <a:latin typeface="Arial"/>
             </a:endParaRPr>
           </a:p>
         </p:txBody>
       </p:sp>
       <p:sp>
         <p:nvSpPr>
-          <p:cNvPr id="27" name="PlaceHolder 2"/>
+          <p:cNvPr id="26" name="PlaceHolder 2"/>
           <p:cNvSpPr>
             <a:spLocks noGrp="1"/>
           </p:cNvSpPr>
@@ -178,17 +178,14 @@
           </a:bodyPr>
           <a:p>
             <a:endParaRPr b="0" lang="en-US" sz="3200" spc="-1" strike="noStrike">
-              <a:solidFill>
-                <a:srgbClr val="000000"/>
-              </a:solidFill>
-              <a:latin typeface="Calibri"/>
+              <a:latin typeface="Arial"/>
             </a:endParaRPr>
           </a:p>
         </p:txBody>
       </p:sp>
       <p:sp>
         <p:nvSpPr>
-          <p:cNvPr id="28" name="PlaceHolder 3"/>
+          <p:cNvPr id="27" name="PlaceHolder 3"/>
           <p:cNvSpPr>
             <a:spLocks noGrp="1"/>
           </p:cNvSpPr>
@@ -215,10 +212,7 @@
           </a:bodyPr>
           <a:p>
             <a:endParaRPr b="0" lang="en-US" sz="3200" spc="-1" strike="noStrike">
-              <a:solidFill>
-                <a:srgbClr val="000000"/>
-              </a:solidFill>
-              <a:latin typeface="Calibri"/>
+              <a:latin typeface="Arial"/>
             </a:endParaRPr>
           </a:p>
         </p:txBody>
@@ -230,7 +224,7 @@
             <a:spLocks noGrp="1"/>
           </p:cNvSpPr>
           <p:nvPr>
-            <p:ph type="ftr" idx="2"/>
+            <p:ph type="ftr" idx="1"/>
           </p:nvPr>
         </p:nvSpPr>
         <p:spPr/>
@@ -250,14 +244,14 @@
             <a:spLocks noGrp="1"/>
           </p:cNvSpPr>
           <p:nvPr>
-            <p:ph type="sldNum" idx="3"/>
+            <p:ph type="sldNum" idx="2"/>
           </p:nvPr>
         </p:nvSpPr>
         <p:spPr/>
         <p:txBody>
           <a:bodyPr/>
           <a:p>
-            <a:fld id="{7E4163EC-2010-4C54-9B11-4398BF8A7703}" type="slidenum">
+            <a:fld id="{10047622-F73F-4407-9602-163821BD1BD2}" type="slidenum">
               <a:t>&lt;#&gt;</a:t>
             </a:fld>
           </a:p>
@@ -270,7 +264,7 @@
             <a:spLocks noGrp="1"/>
           </p:cNvSpPr>
           <p:nvPr>
-            <p:ph type="dt" idx="1"/>
+            <p:ph type="dt" idx="3"/>
           </p:nvPr>
         </p:nvSpPr>
         <p:spPr/>
@@ -308,7 +302,7 @@
       </p:grpSpPr>
       <p:sp>
         <p:nvSpPr>
-          <p:cNvPr id="29" name="PlaceHolder 1"/>
+          <p:cNvPr id="28" name="PlaceHolder 1"/>
           <p:cNvSpPr>
             <a:spLocks noGrp="1"/>
           </p:cNvSpPr>
@@ -319,7 +313,7 @@
         <p:spPr>
           <a:xfrm>
             <a:off x="685800" y="2130480"/>
-            <a:ext cx="7772040" cy="1469520"/>
+            <a:ext cx="7771680" cy="1469160"/>
           </a:xfrm>
           <a:prstGeom prst="rect">
             <a:avLst/>
@@ -334,18 +328,18 @@
             <a:noAutofit/>
           </a:bodyPr>
           <a:p>
-            <a:endParaRPr b="0" lang="en-US" sz="1800" spc="-1" strike="noStrike">
-              <a:solidFill>
-                <a:srgbClr val="000000"/>
-              </a:solidFill>
-              <a:latin typeface="Calibri"/>
+            <a:pPr algn="ctr">
+              <a:buNone/>
+            </a:pPr>
+            <a:endParaRPr b="0" lang="en-US" sz="4400" spc="-1" strike="noStrike">
+              <a:latin typeface="Arial"/>
             </a:endParaRPr>
           </a:p>
         </p:txBody>
       </p:sp>
       <p:sp>
         <p:nvSpPr>
-          <p:cNvPr id="30" name="PlaceHolder 2"/>
+          <p:cNvPr id="29" name="PlaceHolder 2"/>
           <p:cNvSpPr>
             <a:spLocks noGrp="1"/>
           </p:cNvSpPr>
@@ -372,17 +366,14 @@
           </a:bodyPr>
           <a:p>
             <a:endParaRPr b="0" lang="en-US" sz="3200" spc="-1" strike="noStrike">
-              <a:solidFill>
-                <a:srgbClr val="000000"/>
-              </a:solidFill>
-              <a:latin typeface="Calibri"/>
+              <a:latin typeface="Arial"/>
             </a:endParaRPr>
           </a:p>
         </p:txBody>
       </p:sp>
       <p:sp>
         <p:nvSpPr>
-          <p:cNvPr id="31" name="PlaceHolder 3"/>
+          <p:cNvPr id="30" name="PlaceHolder 3"/>
           <p:cNvSpPr>
             <a:spLocks noGrp="1"/>
           </p:cNvSpPr>
@@ -409,17 +400,14 @@
           </a:bodyPr>
           <a:p>
             <a:endParaRPr b="0" lang="en-US" sz="3200" spc="-1" strike="noStrike">
-              <a:solidFill>
-                <a:srgbClr val="000000"/>
-              </a:solidFill>
-              <a:latin typeface="Calibri"/>
+              <a:latin typeface="Arial"/>
             </a:endParaRPr>
           </a:p>
         </p:txBody>
       </p:sp>
       <p:sp>
         <p:nvSpPr>
-          <p:cNvPr id="32" name="PlaceHolder 4"/>
+          <p:cNvPr id="31" name="PlaceHolder 4"/>
           <p:cNvSpPr>
             <a:spLocks noGrp="1"/>
           </p:cNvSpPr>
@@ -446,17 +434,14 @@
           </a:bodyPr>
           <a:p>
             <a:endParaRPr b="0" lang="en-US" sz="3200" spc="-1" strike="noStrike">
-              <a:solidFill>
-                <a:srgbClr val="000000"/>
-              </a:solidFill>
-              <a:latin typeface="Calibri"/>
+              <a:latin typeface="Arial"/>
             </a:endParaRPr>
           </a:p>
         </p:txBody>
       </p:sp>
       <p:sp>
         <p:nvSpPr>
-          <p:cNvPr id="33" name="PlaceHolder 5"/>
+          <p:cNvPr id="32" name="PlaceHolder 5"/>
           <p:cNvSpPr>
             <a:spLocks noGrp="1"/>
           </p:cNvSpPr>
@@ -483,10 +468,7 @@
           </a:bodyPr>
           <a:p>
             <a:endParaRPr b="0" lang="en-US" sz="3200" spc="-1" strike="noStrike">
-              <a:solidFill>
-                <a:srgbClr val="000000"/>
-              </a:solidFill>
-              <a:latin typeface="Calibri"/>
+              <a:latin typeface="Arial"/>
             </a:endParaRPr>
           </a:p>
         </p:txBody>
@@ -498,7 +480,7 @@
             <a:spLocks noGrp="1"/>
           </p:cNvSpPr>
           <p:nvPr>
-            <p:ph type="ftr" idx="2"/>
+            <p:ph type="ftr" idx="1"/>
           </p:nvPr>
         </p:nvSpPr>
         <p:spPr/>
@@ -518,14 +500,14 @@
             <a:spLocks noGrp="1"/>
           </p:cNvSpPr>
           <p:nvPr>
-            <p:ph type="sldNum" idx="3"/>
+            <p:ph type="sldNum" idx="2"/>
           </p:nvPr>
         </p:nvSpPr>
         <p:spPr/>
         <p:txBody>
           <a:bodyPr/>
           <a:p>
-            <a:fld id="{3E692D51-37DB-413C-8B45-56BCD9CD554D}" type="slidenum">
+            <a:fld id="{34992357-85A6-45E4-8BB0-97AACF5CC55F}" type="slidenum">
               <a:t>&lt;#&gt;</a:t>
             </a:fld>
           </a:p>
@@ -538,7 +520,7 @@
             <a:spLocks noGrp="1"/>
           </p:cNvSpPr>
           <p:nvPr>
-            <p:ph type="dt" idx="1"/>
+            <p:ph type="dt" idx="3"/>
           </p:nvPr>
         </p:nvSpPr>
         <p:spPr/>
@@ -576,7 +558,7 @@
       </p:grpSpPr>
       <p:sp>
         <p:nvSpPr>
-          <p:cNvPr id="34" name="PlaceHolder 1"/>
+          <p:cNvPr id="33" name="PlaceHolder 1"/>
           <p:cNvSpPr>
             <a:spLocks noGrp="1"/>
           </p:cNvSpPr>
@@ -587,7 +569,7 @@
         <p:spPr>
           <a:xfrm>
             <a:off x="685800" y="2130480"/>
-            <a:ext cx="7772040" cy="1469520"/>
+            <a:ext cx="7771680" cy="1469160"/>
           </a:xfrm>
           <a:prstGeom prst="rect">
             <a:avLst/>
@@ -602,18 +584,18 @@
             <a:noAutofit/>
           </a:bodyPr>
           <a:p>
-            <a:endParaRPr b="0" lang="en-US" sz="1800" spc="-1" strike="noStrike">
-              <a:solidFill>
-                <a:srgbClr val="000000"/>
-              </a:solidFill>
-              <a:latin typeface="Calibri"/>
+            <a:pPr algn="ctr">
+              <a:buNone/>
+            </a:pPr>
+            <a:endParaRPr b="0" lang="en-US" sz="4400" spc="-1" strike="noStrike">
+              <a:latin typeface="Arial"/>
             </a:endParaRPr>
           </a:p>
         </p:txBody>
       </p:sp>
       <p:sp>
         <p:nvSpPr>
-          <p:cNvPr id="35" name="PlaceHolder 2"/>
+          <p:cNvPr id="34" name="PlaceHolder 2"/>
           <p:cNvSpPr>
             <a:spLocks noGrp="1"/>
           </p:cNvSpPr>
@@ -640,17 +622,14 @@
           </a:bodyPr>
           <a:p>
             <a:endParaRPr b="0" lang="en-US" sz="3200" spc="-1" strike="noStrike">
-              <a:solidFill>
-                <a:srgbClr val="000000"/>
-              </a:solidFill>
-              <a:latin typeface="Calibri"/>
+              <a:latin typeface="Arial"/>
             </a:endParaRPr>
           </a:p>
         </p:txBody>
       </p:sp>
       <p:sp>
         <p:nvSpPr>
-          <p:cNvPr id="36" name="PlaceHolder 3"/>
+          <p:cNvPr id="35" name="PlaceHolder 3"/>
           <p:cNvSpPr>
             <a:spLocks noGrp="1"/>
           </p:cNvSpPr>
@@ -677,17 +656,14 @@
           </a:bodyPr>
           <a:p>
             <a:endParaRPr b="0" lang="en-US" sz="3200" spc="-1" strike="noStrike">
-              <a:solidFill>
-                <a:srgbClr val="000000"/>
-              </a:solidFill>
-              <a:latin typeface="Calibri"/>
+              <a:latin typeface="Arial"/>
             </a:endParaRPr>
           </a:p>
         </p:txBody>
       </p:sp>
       <p:sp>
         <p:nvSpPr>
-          <p:cNvPr id="37" name="PlaceHolder 4"/>
+          <p:cNvPr id="36" name="PlaceHolder 4"/>
           <p:cNvSpPr>
             <a:spLocks noGrp="1"/>
           </p:cNvSpPr>
@@ -714,17 +690,14 @@
           </a:bodyPr>
           <a:p>
             <a:endParaRPr b="0" lang="en-US" sz="3200" spc="-1" strike="noStrike">
-              <a:solidFill>
-                <a:srgbClr val="000000"/>
-              </a:solidFill>
-              <a:latin typeface="Calibri"/>
+              <a:latin typeface="Arial"/>
             </a:endParaRPr>
           </a:p>
         </p:txBody>
       </p:sp>
       <p:sp>
         <p:nvSpPr>
-          <p:cNvPr id="38" name="PlaceHolder 5"/>
+          <p:cNvPr id="37" name="PlaceHolder 5"/>
           <p:cNvSpPr>
             <a:spLocks noGrp="1"/>
           </p:cNvSpPr>
@@ -751,17 +724,14 @@
           </a:bodyPr>
           <a:p>
             <a:endParaRPr b="0" lang="en-US" sz="3200" spc="-1" strike="noStrike">
-              <a:solidFill>
-                <a:srgbClr val="000000"/>
-              </a:solidFill>
-              <a:latin typeface="Calibri"/>
+              <a:latin typeface="Arial"/>
             </a:endParaRPr>
           </a:p>
         </p:txBody>
       </p:sp>
       <p:sp>
         <p:nvSpPr>
-          <p:cNvPr id="39" name="PlaceHolder 6"/>
+          <p:cNvPr id="38" name="PlaceHolder 6"/>
           <p:cNvSpPr>
             <a:spLocks noGrp="1"/>
           </p:cNvSpPr>
@@ -788,17 +758,14 @@
           </a:bodyPr>
           <a:p>
             <a:endParaRPr b="0" lang="en-US" sz="3200" spc="-1" strike="noStrike">
-              <a:solidFill>
-                <a:srgbClr val="000000"/>
-              </a:solidFill>
-              <a:latin typeface="Calibri"/>
+              <a:latin typeface="Arial"/>
             </a:endParaRPr>
           </a:p>
         </p:txBody>
       </p:sp>
       <p:sp>
         <p:nvSpPr>
-          <p:cNvPr id="40" name="PlaceHolder 7"/>
+          <p:cNvPr id="39" name="PlaceHolder 7"/>
           <p:cNvSpPr>
             <a:spLocks noGrp="1"/>
           </p:cNvSpPr>
@@ -825,10 +792,7 @@
           </a:bodyPr>
           <a:p>
             <a:endParaRPr b="0" lang="en-US" sz="3200" spc="-1" strike="noStrike">
-              <a:solidFill>
-                <a:srgbClr val="000000"/>
-              </a:solidFill>
-              <a:latin typeface="Calibri"/>
+              <a:latin typeface="Arial"/>
             </a:endParaRPr>
           </a:p>
         </p:txBody>
@@ -840,7 +804,7 @@
             <a:spLocks noGrp="1"/>
           </p:cNvSpPr>
           <p:nvPr>
-            <p:ph type="ftr" idx="2"/>
+            <p:ph type="ftr" idx="1"/>
           </p:nvPr>
         </p:nvSpPr>
         <p:spPr/>
@@ -860,14 +824,14 @@
             <a:spLocks noGrp="1"/>
           </p:cNvSpPr>
           <p:nvPr>
-            <p:ph type="sldNum" idx="3"/>
+            <p:ph type="sldNum" idx="2"/>
           </p:nvPr>
         </p:nvSpPr>
         <p:spPr/>
         <p:txBody>
           <a:bodyPr/>
           <a:p>
-            <a:fld id="{0954A456-F87A-4196-982E-6FDF303F3D50}" type="slidenum">
+            <a:fld id="{07C7648C-104E-431B-8107-B7038969333E}" type="slidenum">
               <a:t>&lt;#&gt;</a:t>
             </a:fld>
           </a:p>
@@ -880,7 +844,7 @@
             <a:spLocks noGrp="1"/>
           </p:cNvSpPr>
           <p:nvPr>
-            <p:ph type="dt" idx="1"/>
+            <p:ph type="dt" idx="3"/>
           </p:nvPr>
         </p:nvSpPr>
         <p:spPr/>
@@ -918,7 +882,7 @@
       </p:grpSpPr>
       <p:sp>
         <p:nvSpPr>
-          <p:cNvPr id="5" name="PlaceHolder 1"/>
+          <p:cNvPr id="4" name="PlaceHolder 1"/>
           <p:cNvSpPr>
             <a:spLocks noGrp="1"/>
           </p:cNvSpPr>
@@ -929,7 +893,7 @@
         <p:spPr>
           <a:xfrm>
             <a:off x="685800" y="2130480"/>
-            <a:ext cx="7772040" cy="1469520"/>
+            <a:ext cx="7771680" cy="1469160"/>
           </a:xfrm>
           <a:prstGeom prst="rect">
             <a:avLst/>
@@ -944,18 +908,18 @@
             <a:noAutofit/>
           </a:bodyPr>
           <a:p>
-            <a:endParaRPr b="0" lang="en-US" sz="1800" spc="-1" strike="noStrike">
-              <a:solidFill>
-                <a:srgbClr val="000000"/>
-              </a:solidFill>
-              <a:latin typeface="Calibri"/>
+            <a:pPr algn="ctr">
+              <a:buNone/>
+            </a:pPr>
+            <a:endParaRPr b="0" lang="en-US" sz="4400" spc="-1" strike="noStrike">
+              <a:latin typeface="Arial"/>
             </a:endParaRPr>
           </a:p>
         </p:txBody>
       </p:sp>
       <p:sp>
         <p:nvSpPr>
-          <p:cNvPr id="6" name="PlaceHolder 2"/>
+          <p:cNvPr id="5" name="PlaceHolder 2"/>
           <p:cNvSpPr>
             <a:spLocks noGrp="1"/>
           </p:cNvSpPr>
@@ -997,7 +961,7 @@
             <a:spLocks noGrp="1"/>
           </p:cNvSpPr>
           <p:nvPr>
-            <p:ph type="ftr" idx="2"/>
+            <p:ph type="ftr" idx="1"/>
           </p:nvPr>
         </p:nvSpPr>
         <p:spPr/>
@@ -1017,14 +981,14 @@
             <a:spLocks noGrp="1"/>
           </p:cNvSpPr>
           <p:nvPr>
-            <p:ph type="sldNum" idx="3"/>
+            <p:ph type="sldNum" idx="2"/>
           </p:nvPr>
         </p:nvSpPr>
         <p:spPr/>
         <p:txBody>
           <a:bodyPr/>
           <a:p>
-            <a:fld id="{0D787589-513B-4837-84D8-824B7FDA9855}" type="slidenum">
+            <a:fld id="{3A7D21C4-3EF6-483D-B1DB-5F88479D3950}" type="slidenum">
               <a:t>&lt;#&gt;</a:t>
             </a:fld>
           </a:p>
@@ -1037,7 +1001,7 @@
             <a:spLocks noGrp="1"/>
           </p:cNvSpPr>
           <p:nvPr>
-            <p:ph type="dt" idx="1"/>
+            <p:ph type="dt" idx="3"/>
           </p:nvPr>
         </p:nvSpPr>
         <p:spPr/>
@@ -1075,7 +1039,7 @@
       </p:grpSpPr>
       <p:sp>
         <p:nvSpPr>
-          <p:cNvPr id="7" name="PlaceHolder 1"/>
+          <p:cNvPr id="6" name="PlaceHolder 1"/>
           <p:cNvSpPr>
             <a:spLocks noGrp="1"/>
           </p:cNvSpPr>
@@ -1086,7 +1050,7 @@
         <p:spPr>
           <a:xfrm>
             <a:off x="685800" y="2130480"/>
-            <a:ext cx="7772040" cy="1469520"/>
+            <a:ext cx="7771680" cy="1469160"/>
           </a:xfrm>
           <a:prstGeom prst="rect">
             <a:avLst/>
@@ -1101,18 +1065,18 @@
             <a:noAutofit/>
           </a:bodyPr>
           <a:p>
-            <a:endParaRPr b="0" lang="en-US" sz="1800" spc="-1" strike="noStrike">
-              <a:solidFill>
-                <a:srgbClr val="000000"/>
-              </a:solidFill>
-              <a:latin typeface="Calibri"/>
+            <a:pPr algn="ctr">
+              <a:buNone/>
+            </a:pPr>
+            <a:endParaRPr b="0" lang="en-US" sz="4400" spc="-1" strike="noStrike">
+              <a:latin typeface="Arial"/>
             </a:endParaRPr>
           </a:p>
         </p:txBody>
       </p:sp>
       <p:sp>
         <p:nvSpPr>
-          <p:cNvPr id="8" name="PlaceHolder 2"/>
+          <p:cNvPr id="7" name="PlaceHolder 2"/>
           <p:cNvSpPr>
             <a:spLocks noGrp="1"/>
           </p:cNvSpPr>
@@ -1139,10 +1103,7 @@
           </a:bodyPr>
           <a:p>
             <a:endParaRPr b="0" lang="en-US" sz="3200" spc="-1" strike="noStrike">
-              <a:solidFill>
-                <a:srgbClr val="000000"/>
-              </a:solidFill>
-              <a:latin typeface="Calibri"/>
+              <a:latin typeface="Arial"/>
             </a:endParaRPr>
           </a:p>
         </p:txBody>
@@ -1154,7 +1115,7 @@
             <a:spLocks noGrp="1"/>
           </p:cNvSpPr>
           <p:nvPr>
-            <p:ph type="ftr" idx="2"/>
+            <p:ph type="ftr" idx="1"/>
           </p:nvPr>
         </p:nvSpPr>
         <p:spPr/>
@@ -1174,14 +1135,14 @@
             <a:spLocks noGrp="1"/>
           </p:cNvSpPr>
           <p:nvPr>
-            <p:ph type="sldNum" idx="3"/>
+            <p:ph type="sldNum" idx="2"/>
           </p:nvPr>
         </p:nvSpPr>
         <p:spPr/>
         <p:txBody>
           <a:bodyPr/>
           <a:p>
-            <a:fld id="{C5EFD214-1BC1-46E1-8336-CB8D2A944953}" type="slidenum">
+            <a:fld id="{C15E5546-1F82-4059-B298-69DBF65FB250}" type="slidenum">
               <a:t>&lt;#&gt;</a:t>
             </a:fld>
           </a:p>
@@ -1194,7 +1155,7 @@
             <a:spLocks noGrp="1"/>
           </p:cNvSpPr>
           <p:nvPr>
-            <p:ph type="dt" idx="1"/>
+            <p:ph type="dt" idx="3"/>
           </p:nvPr>
         </p:nvSpPr>
         <p:spPr/>
@@ -1232,7 +1193,7 @@
       </p:grpSpPr>
       <p:sp>
         <p:nvSpPr>
-          <p:cNvPr id="9" name="PlaceHolder 1"/>
+          <p:cNvPr id="8" name="PlaceHolder 1"/>
           <p:cNvSpPr>
             <a:spLocks noGrp="1"/>
           </p:cNvSpPr>
@@ -1243,7 +1204,7 @@
         <p:spPr>
           <a:xfrm>
             <a:off x="685800" y="2130480"/>
-            <a:ext cx="7772040" cy="1469520"/>
+            <a:ext cx="7771680" cy="1469160"/>
           </a:xfrm>
           <a:prstGeom prst="rect">
             <a:avLst/>
@@ -1258,18 +1219,18 @@
             <a:noAutofit/>
           </a:bodyPr>
           <a:p>
-            <a:endParaRPr b="0" lang="en-US" sz="1800" spc="-1" strike="noStrike">
-              <a:solidFill>
-                <a:srgbClr val="000000"/>
-              </a:solidFill>
-              <a:latin typeface="Calibri"/>
+            <a:pPr algn="ctr">
+              <a:buNone/>
+            </a:pPr>
+            <a:endParaRPr b="0" lang="en-US" sz="4400" spc="-1" strike="noStrike">
+              <a:latin typeface="Arial"/>
             </a:endParaRPr>
           </a:p>
         </p:txBody>
       </p:sp>
       <p:sp>
         <p:nvSpPr>
-          <p:cNvPr id="10" name="PlaceHolder 2"/>
+          <p:cNvPr id="9" name="PlaceHolder 2"/>
           <p:cNvSpPr>
             <a:spLocks noGrp="1"/>
           </p:cNvSpPr>
@@ -1296,17 +1257,14 @@
           </a:bodyPr>
           <a:p>
             <a:endParaRPr b="0" lang="en-US" sz="3200" spc="-1" strike="noStrike">
-              <a:solidFill>
-                <a:srgbClr val="000000"/>
-              </a:solidFill>
-              <a:latin typeface="Calibri"/>
+              <a:latin typeface="Arial"/>
             </a:endParaRPr>
           </a:p>
         </p:txBody>
       </p:sp>
       <p:sp>
         <p:nvSpPr>
-          <p:cNvPr id="11" name="PlaceHolder 3"/>
+          <p:cNvPr id="10" name="PlaceHolder 3"/>
           <p:cNvSpPr>
             <a:spLocks noGrp="1"/>
           </p:cNvSpPr>
@@ -1333,10 +1291,7 @@
           </a:bodyPr>
           <a:p>
             <a:endParaRPr b="0" lang="en-US" sz="3200" spc="-1" strike="noStrike">
-              <a:solidFill>
-                <a:srgbClr val="000000"/>
-              </a:solidFill>
-              <a:latin typeface="Calibri"/>
+              <a:latin typeface="Arial"/>
             </a:endParaRPr>
           </a:p>
         </p:txBody>
@@ -1348,7 +1303,7 @@
             <a:spLocks noGrp="1"/>
           </p:cNvSpPr>
           <p:nvPr>
-            <p:ph type="ftr" idx="2"/>
+            <p:ph type="ftr" idx="1"/>
           </p:nvPr>
         </p:nvSpPr>
         <p:spPr/>
@@ -1368,14 +1323,14 @@
             <a:spLocks noGrp="1"/>
           </p:cNvSpPr>
           <p:nvPr>
-            <p:ph type="sldNum" idx="3"/>
+            <p:ph type="sldNum" idx="2"/>
           </p:nvPr>
         </p:nvSpPr>
         <p:spPr/>
         <p:txBody>
           <a:bodyPr/>
           <a:p>
-            <a:fld id="{ECFB4FB6-A07B-4395-8647-C03CCFC9BBF4}" type="slidenum">
+            <a:fld id="{0C9AEF83-D0A5-4EA9-BF83-3DF0FF9878C0}" type="slidenum">
               <a:t>&lt;#&gt;</a:t>
             </a:fld>
           </a:p>
@@ -1388,7 +1343,7 @@
             <a:spLocks noGrp="1"/>
           </p:cNvSpPr>
           <p:nvPr>
-            <p:ph type="dt" idx="1"/>
+            <p:ph type="dt" idx="3"/>
           </p:nvPr>
         </p:nvSpPr>
         <p:spPr/>
@@ -1426,7 +1381,7 @@
       </p:grpSpPr>
       <p:sp>
         <p:nvSpPr>
-          <p:cNvPr id="12" name="PlaceHolder 1"/>
+          <p:cNvPr id="11" name="PlaceHolder 1"/>
           <p:cNvSpPr>
             <a:spLocks noGrp="1"/>
           </p:cNvSpPr>
@@ -1437,7 +1392,7 @@
         <p:spPr>
           <a:xfrm>
             <a:off x="685800" y="2130480"/>
-            <a:ext cx="7772040" cy="1469520"/>
+            <a:ext cx="7771680" cy="1469160"/>
           </a:xfrm>
           <a:prstGeom prst="rect">
             <a:avLst/>
@@ -1452,11 +1407,11 @@
             <a:noAutofit/>
           </a:bodyPr>
           <a:p>
-            <a:endParaRPr b="0" lang="en-US" sz="1800" spc="-1" strike="noStrike">
-              <a:solidFill>
-                <a:srgbClr val="000000"/>
-              </a:solidFill>
-              <a:latin typeface="Calibri"/>
+            <a:pPr algn="ctr">
+              <a:buNone/>
+            </a:pPr>
+            <a:endParaRPr b="0" lang="en-US" sz="4400" spc="-1" strike="noStrike">
+              <a:latin typeface="Arial"/>
             </a:endParaRPr>
           </a:p>
         </p:txBody>
@@ -1468,7 +1423,7 @@
             <a:spLocks noGrp="1"/>
           </p:cNvSpPr>
           <p:nvPr>
-            <p:ph type="ftr" idx="2"/>
+            <p:ph type="ftr" idx="1"/>
           </p:nvPr>
         </p:nvSpPr>
         <p:spPr/>
@@ -1488,14 +1443,14 @@
             <a:spLocks noGrp="1"/>
           </p:cNvSpPr>
           <p:nvPr>
-            <p:ph type="sldNum" idx="3"/>
+            <p:ph type="sldNum" idx="2"/>
           </p:nvPr>
         </p:nvSpPr>
         <p:spPr/>
         <p:txBody>
           <a:bodyPr/>
           <a:p>
-            <a:fld id="{ED354211-9B82-4619-85BE-D6A57CA8BA6A}" type="slidenum">
+            <a:fld id="{B22398F4-74F7-4F28-B1D2-347C01DDBC24}" type="slidenum">
               <a:t>&lt;#&gt;</a:t>
             </a:fld>
           </a:p>
@@ -1508,7 +1463,7 @@
             <a:spLocks noGrp="1"/>
           </p:cNvSpPr>
           <p:nvPr>
-            <p:ph type="dt" idx="1"/>
+            <p:ph type="dt" idx="3"/>
           </p:nvPr>
         </p:nvSpPr>
         <p:spPr/>
@@ -1546,7 +1501,7 @@
       </p:grpSpPr>
       <p:sp>
         <p:nvSpPr>
-          <p:cNvPr id="13" name="PlaceHolder 1"/>
+          <p:cNvPr id="12" name="PlaceHolder 1"/>
           <p:cNvSpPr>
             <a:spLocks noGrp="1"/>
           </p:cNvSpPr>
@@ -1557,7 +1512,7 @@
         <p:spPr>
           <a:xfrm>
             <a:off x="685800" y="2130480"/>
-            <a:ext cx="7772040" cy="6813000"/>
+            <a:ext cx="7771680" cy="6811560"/>
           </a:xfrm>
           <a:prstGeom prst="rect">
             <a:avLst/>
@@ -1588,7 +1543,7 @@
             <a:spLocks noGrp="1"/>
           </p:cNvSpPr>
           <p:nvPr>
-            <p:ph type="ftr" idx="2"/>
+            <p:ph type="ftr" idx="1"/>
           </p:nvPr>
         </p:nvSpPr>
         <p:spPr/>
@@ -1608,14 +1563,14 @@
             <a:spLocks noGrp="1"/>
           </p:cNvSpPr>
           <p:nvPr>
-            <p:ph type="sldNum" idx="3"/>
+            <p:ph type="sldNum" idx="2"/>
           </p:nvPr>
         </p:nvSpPr>
         <p:spPr/>
         <p:txBody>
           <a:bodyPr/>
           <a:p>
-            <a:fld id="{974BB6D4-BFAD-454D-8C12-0CE7A37DB9A3}" type="slidenum">
+            <a:fld id="{E2309E66-46CC-403B-A4CF-1F851992AB46}" type="slidenum">
               <a:t>&lt;#&gt;</a:t>
             </a:fld>
           </a:p>
@@ -1628,7 +1583,7 @@
             <a:spLocks noGrp="1"/>
           </p:cNvSpPr>
           <p:nvPr>
-            <p:ph type="dt" idx="1"/>
+            <p:ph type="dt" idx="3"/>
           </p:nvPr>
         </p:nvSpPr>
         <p:spPr/>
@@ -1666,7 +1621,7 @@
       </p:grpSpPr>
       <p:sp>
         <p:nvSpPr>
-          <p:cNvPr id="14" name="PlaceHolder 1"/>
+          <p:cNvPr id="13" name="PlaceHolder 1"/>
           <p:cNvSpPr>
             <a:spLocks noGrp="1"/>
           </p:cNvSpPr>
@@ -1677,7 +1632,7 @@
         <p:spPr>
           <a:xfrm>
             <a:off x="685800" y="2130480"/>
-            <a:ext cx="7772040" cy="1469520"/>
+            <a:ext cx="7771680" cy="1469160"/>
           </a:xfrm>
           <a:prstGeom prst="rect">
             <a:avLst/>
@@ -1692,18 +1647,18 @@
             <a:noAutofit/>
           </a:bodyPr>
           <a:p>
-            <a:endParaRPr b="0" lang="en-US" sz="1800" spc="-1" strike="noStrike">
-              <a:solidFill>
-                <a:srgbClr val="000000"/>
-              </a:solidFill>
-              <a:latin typeface="Calibri"/>
+            <a:pPr algn="ctr">
+              <a:buNone/>
+            </a:pPr>
+            <a:endParaRPr b="0" lang="en-US" sz="4400" spc="-1" strike="noStrike">
+              <a:latin typeface="Arial"/>
             </a:endParaRPr>
           </a:p>
         </p:txBody>
       </p:sp>
       <p:sp>
         <p:nvSpPr>
-          <p:cNvPr id="15" name="PlaceHolder 2"/>
+          <p:cNvPr id="14" name="PlaceHolder 2"/>
           <p:cNvSpPr>
             <a:spLocks noGrp="1"/>
           </p:cNvSpPr>
@@ -1730,17 +1685,14 @@
           </a:bodyPr>
           <a:p>
             <a:endParaRPr b="0" lang="en-US" sz="3200" spc="-1" strike="noStrike">
-              <a:solidFill>
-                <a:srgbClr val="000000"/>
-              </a:solidFill>
-              <a:latin typeface="Calibri"/>
+              <a:latin typeface="Arial"/>
             </a:endParaRPr>
           </a:p>
         </p:txBody>
       </p:sp>
       <p:sp>
         <p:nvSpPr>
-          <p:cNvPr id="16" name="PlaceHolder 3"/>
+          <p:cNvPr id="15" name="PlaceHolder 3"/>
           <p:cNvSpPr>
             <a:spLocks noGrp="1"/>
           </p:cNvSpPr>
@@ -1767,17 +1719,14 @@
           </a:bodyPr>
           <a:p>
             <a:endParaRPr b="0" lang="en-US" sz="3200" spc="-1" strike="noStrike">
-              <a:solidFill>
-                <a:srgbClr val="000000"/>
-              </a:solidFill>
-              <a:latin typeface="Calibri"/>
+              <a:latin typeface="Arial"/>
             </a:endParaRPr>
           </a:p>
         </p:txBody>
       </p:sp>
       <p:sp>
         <p:nvSpPr>
-          <p:cNvPr id="17" name="PlaceHolder 4"/>
+          <p:cNvPr id="16" name="PlaceHolder 4"/>
           <p:cNvSpPr>
             <a:spLocks noGrp="1"/>
           </p:cNvSpPr>
@@ -1804,10 +1753,7 @@
           </a:bodyPr>
           <a:p>
             <a:endParaRPr b="0" lang="en-US" sz="3200" spc="-1" strike="noStrike">
-              <a:solidFill>
-                <a:srgbClr val="000000"/>
-              </a:solidFill>
-              <a:latin typeface="Calibri"/>
+              <a:latin typeface="Arial"/>
             </a:endParaRPr>
           </a:p>
         </p:txBody>
@@ -1819,7 +1765,7 @@
             <a:spLocks noGrp="1"/>
           </p:cNvSpPr>
           <p:nvPr>
-            <p:ph type="ftr" idx="2"/>
+            <p:ph type="ftr" idx="1"/>
           </p:nvPr>
         </p:nvSpPr>
         <p:spPr/>
@@ -1839,14 +1785,14 @@
             <a:spLocks noGrp="1"/>
           </p:cNvSpPr>
           <p:nvPr>
-            <p:ph type="sldNum" idx="3"/>
+            <p:ph type="sldNum" idx="2"/>
           </p:nvPr>
         </p:nvSpPr>
         <p:spPr/>
         <p:txBody>
           <a:bodyPr/>
           <a:p>
-            <a:fld id="{329DFED5-BCC1-446A-BA64-E02BCBDFE1B3}" type="slidenum">
+            <a:fld id="{31A09DEA-5DDF-46C3-85EE-7AC7998F524F}" type="slidenum">
               <a:t>&lt;#&gt;</a:t>
             </a:fld>
           </a:p>
@@ -1859,7 +1805,7 @@
             <a:spLocks noGrp="1"/>
           </p:cNvSpPr>
           <p:nvPr>
-            <p:ph type="dt" idx="1"/>
+            <p:ph type="dt" idx="3"/>
           </p:nvPr>
         </p:nvSpPr>
         <p:spPr/>
@@ -1897,7 +1843,7 @@
       </p:grpSpPr>
       <p:sp>
         <p:nvSpPr>
-          <p:cNvPr id="18" name="PlaceHolder 1"/>
+          <p:cNvPr id="17" name="PlaceHolder 1"/>
           <p:cNvSpPr>
             <a:spLocks noGrp="1"/>
           </p:cNvSpPr>
@@ -1908,7 +1854,7 @@
         <p:spPr>
           <a:xfrm>
             <a:off x="685800" y="2130480"/>
-            <a:ext cx="7772040" cy="1469520"/>
+            <a:ext cx="7771680" cy="1469160"/>
           </a:xfrm>
           <a:prstGeom prst="rect">
             <a:avLst/>
@@ -1923,18 +1869,18 @@
             <a:noAutofit/>
           </a:bodyPr>
           <a:p>
-            <a:endParaRPr b="0" lang="en-US" sz="1800" spc="-1" strike="noStrike">
-              <a:solidFill>
-                <a:srgbClr val="000000"/>
-              </a:solidFill>
-              <a:latin typeface="Calibri"/>
+            <a:pPr algn="ctr">
+              <a:buNone/>
+            </a:pPr>
+            <a:endParaRPr b="0" lang="en-US" sz="4400" spc="-1" strike="noStrike">
+              <a:latin typeface="Arial"/>
             </a:endParaRPr>
           </a:p>
         </p:txBody>
       </p:sp>
       <p:sp>
         <p:nvSpPr>
-          <p:cNvPr id="19" name="PlaceHolder 2"/>
+          <p:cNvPr id="18" name="PlaceHolder 2"/>
           <p:cNvSpPr>
             <a:spLocks noGrp="1"/>
           </p:cNvSpPr>
@@ -1961,17 +1907,14 @@
           </a:bodyPr>
           <a:p>
             <a:endParaRPr b="0" lang="en-US" sz="3200" spc="-1" strike="noStrike">
-              <a:solidFill>
-                <a:srgbClr val="000000"/>
-              </a:solidFill>
-              <a:latin typeface="Calibri"/>
+              <a:latin typeface="Arial"/>
             </a:endParaRPr>
           </a:p>
         </p:txBody>
       </p:sp>
       <p:sp>
         <p:nvSpPr>
-          <p:cNvPr id="20" name="PlaceHolder 3"/>
+          <p:cNvPr id="19" name="PlaceHolder 3"/>
           <p:cNvSpPr>
             <a:spLocks noGrp="1"/>
           </p:cNvSpPr>
@@ -1998,17 +1941,14 @@
           </a:bodyPr>
           <a:p>
             <a:endParaRPr b="0" lang="en-US" sz="3200" spc="-1" strike="noStrike">
-              <a:solidFill>
-                <a:srgbClr val="000000"/>
-              </a:solidFill>
-              <a:latin typeface="Calibri"/>
+              <a:latin typeface="Arial"/>
             </a:endParaRPr>
           </a:p>
         </p:txBody>
       </p:sp>
       <p:sp>
         <p:nvSpPr>
-          <p:cNvPr id="21" name="PlaceHolder 4"/>
+          <p:cNvPr id="20" name="PlaceHolder 4"/>
           <p:cNvSpPr>
             <a:spLocks noGrp="1"/>
           </p:cNvSpPr>
@@ -2035,10 +1975,7 @@
           </a:bodyPr>
           <a:p>
             <a:endParaRPr b="0" lang="en-US" sz="3200" spc="-1" strike="noStrike">
-              <a:solidFill>
-                <a:srgbClr val="000000"/>
-              </a:solidFill>
-              <a:latin typeface="Calibri"/>
+              <a:latin typeface="Arial"/>
             </a:endParaRPr>
           </a:p>
         </p:txBody>
@@ -2050,7 +1987,7 @@
             <a:spLocks noGrp="1"/>
           </p:cNvSpPr>
           <p:nvPr>
-            <p:ph type="ftr" idx="2"/>
+            <p:ph type="ftr" idx="1"/>
           </p:nvPr>
         </p:nvSpPr>
         <p:spPr/>
@@ -2070,14 +2007,14 @@
             <a:spLocks noGrp="1"/>
           </p:cNvSpPr>
           <p:nvPr>
-            <p:ph type="sldNum" idx="3"/>
+            <p:ph type="sldNum" idx="2"/>
           </p:nvPr>
         </p:nvSpPr>
         <p:spPr/>
         <p:txBody>
           <a:bodyPr/>
           <a:p>
-            <a:fld id="{822A66ED-1A48-4E14-BB36-F7159F47D117}" type="slidenum">
+            <a:fld id="{4C646002-4332-4982-A318-4C642338B6B0}" type="slidenum">
               <a:t>&lt;#&gt;</a:t>
             </a:fld>
           </a:p>
@@ -2090,7 +2027,7 @@
             <a:spLocks noGrp="1"/>
           </p:cNvSpPr>
           <p:nvPr>
-            <p:ph type="dt" idx="1"/>
+            <p:ph type="dt" idx="3"/>
           </p:nvPr>
         </p:nvSpPr>
         <p:spPr/>
@@ -2128,7 +2065,7 @@
       </p:grpSpPr>
       <p:sp>
         <p:nvSpPr>
-          <p:cNvPr id="22" name="PlaceHolder 1"/>
+          <p:cNvPr id="21" name="PlaceHolder 1"/>
           <p:cNvSpPr>
             <a:spLocks noGrp="1"/>
           </p:cNvSpPr>
@@ -2139,7 +2076,7 @@
         <p:spPr>
           <a:xfrm>
             <a:off x="685800" y="2130480"/>
-            <a:ext cx="7772040" cy="1469520"/>
+            <a:ext cx="7771680" cy="1469160"/>
           </a:xfrm>
           <a:prstGeom prst="rect">
             <a:avLst/>
@@ -2154,18 +2091,18 @@
             <a:noAutofit/>
           </a:bodyPr>
           <a:p>
-            <a:endParaRPr b="0" lang="en-US" sz="1800" spc="-1" strike="noStrike">
-              <a:solidFill>
-                <a:srgbClr val="000000"/>
-              </a:solidFill>
-              <a:latin typeface="Calibri"/>
+            <a:pPr algn="ctr">
+              <a:buNone/>
+            </a:pPr>
+            <a:endParaRPr b="0" lang="en-US" sz="4400" spc="-1" strike="noStrike">
+              <a:latin typeface="Arial"/>
             </a:endParaRPr>
           </a:p>
         </p:txBody>
       </p:sp>
       <p:sp>
         <p:nvSpPr>
-          <p:cNvPr id="23" name="PlaceHolder 2"/>
+          <p:cNvPr id="22" name="PlaceHolder 2"/>
           <p:cNvSpPr>
             <a:spLocks noGrp="1"/>
           </p:cNvSpPr>
@@ -2192,17 +2129,14 @@
           </a:bodyPr>
           <a:p>
             <a:endParaRPr b="0" lang="en-US" sz="3200" spc="-1" strike="noStrike">
-              <a:solidFill>
-                <a:srgbClr val="000000"/>
-              </a:solidFill>
-              <a:latin typeface="Calibri"/>
+              <a:latin typeface="Arial"/>
             </a:endParaRPr>
           </a:p>
         </p:txBody>
       </p:sp>
       <p:sp>
         <p:nvSpPr>
-          <p:cNvPr id="24" name="PlaceHolder 3"/>
+          <p:cNvPr id="23" name="PlaceHolder 3"/>
           <p:cNvSpPr>
             <a:spLocks noGrp="1"/>
           </p:cNvSpPr>
@@ -2229,17 +2163,14 @@
           </a:bodyPr>
           <a:p>
             <a:endParaRPr b="0" lang="en-US" sz="3200" spc="-1" strike="noStrike">
-              <a:solidFill>
-                <a:srgbClr val="000000"/>
-              </a:solidFill>
-              <a:latin typeface="Calibri"/>
+              <a:latin typeface="Arial"/>
             </a:endParaRPr>
           </a:p>
         </p:txBody>
       </p:sp>
       <p:sp>
         <p:nvSpPr>
-          <p:cNvPr id="25" name="PlaceHolder 4"/>
+          <p:cNvPr id="24" name="PlaceHolder 4"/>
           <p:cNvSpPr>
             <a:spLocks noGrp="1"/>
           </p:cNvSpPr>
@@ -2266,10 +2197,7 @@
           </a:bodyPr>
           <a:p>
             <a:endParaRPr b="0" lang="en-US" sz="3200" spc="-1" strike="noStrike">
-              <a:solidFill>
-                <a:srgbClr val="000000"/>
-              </a:solidFill>
-              <a:latin typeface="Calibri"/>
+              <a:latin typeface="Arial"/>
             </a:endParaRPr>
           </a:p>
         </p:txBody>
@@ -2281,7 +2209,7 @@
             <a:spLocks noGrp="1"/>
           </p:cNvSpPr>
           <p:nvPr>
-            <p:ph type="ftr" idx="2"/>
+            <p:ph type="ftr" idx="1"/>
           </p:nvPr>
         </p:nvSpPr>
         <p:spPr/>
@@ -2301,14 +2229,14 @@
             <a:spLocks noGrp="1"/>
           </p:cNvSpPr>
           <p:nvPr>
-            <p:ph type="sldNum" idx="3"/>
+            <p:ph type="sldNum" idx="2"/>
           </p:nvPr>
         </p:nvSpPr>
         <p:spPr/>
         <p:txBody>
           <a:bodyPr/>
           <a:p>
-            <a:fld id="{2AB8BE71-08CF-41EC-8DF0-C0589BE92B0E}" type="slidenum">
+            <a:fld id="{1A0C5F2E-EE42-4352-98D5-5D5B2AB117A8}" type="slidenum">
               <a:t>&lt;#&gt;</a:t>
             </a:fld>
           </a:p>
@@ -2321,7 +2249,7 @@
             <a:spLocks noGrp="1"/>
           </p:cNvSpPr>
           <p:nvPr>
-            <p:ph type="dt" idx="1"/>
+            <p:ph type="dt" idx="3"/>
           </p:nvPr>
         </p:nvSpPr>
         <p:spPr/>
@@ -2377,7 +2305,7 @@
         <p:spPr>
           <a:xfrm>
             <a:off x="685800" y="2130480"/>
-            <a:ext cx="7772040" cy="1469520"/>
+            <a:ext cx="7771680" cy="1469160"/>
           </a:xfrm>
           <a:prstGeom prst="rect">
             <a:avLst/>
@@ -2388,30 +2316,18 @@
           </a:ln>
         </p:spPr>
         <p:txBody>
-          <a:bodyPr anchor="ctr">
+          <a:bodyPr lIns="0" rIns="0" tIns="0" bIns="0" anchor="ctr">
             <a:noAutofit/>
           </a:bodyPr>
           <a:p>
-            <a:pPr algn="ctr">
-              <a:lnSpc>
-                <a:spcPct val="100000"/>
-              </a:lnSpc>
-              <a:buNone/>
-            </a:pPr>
             <a:r>
-              <a:rPr b="0" lang="en-US" sz="4400" spc="-1" strike="noStrike">
-                <a:solidFill>
-                  <a:srgbClr val="000000"/>
-                </a:solidFill>
-                <a:latin typeface="Calibri"/>
+              <a:rPr b="0" lang="en-US" sz="1800" spc="-1" strike="noStrike">
+                <a:latin typeface="Arial"/>
               </a:rPr>
-              <a:t>Click to edit Master title style</a:t>
+              <a:t>Click to edit the title text format</a:t>
             </a:r>
-            <a:endParaRPr b="0" lang="en-US" sz="4400" spc="-1" strike="noStrike">
-              <a:solidFill>
-                <a:srgbClr val="000000"/>
-              </a:solidFill>
-              <a:latin typeface="Calibri"/>
+            <a:endParaRPr b="0" lang="en-US" sz="1800" spc="-1" strike="noStrike">
+              <a:latin typeface="Arial"/>
             </a:endParaRPr>
           </a:p>
         </p:txBody>
@@ -2423,13 +2339,13 @@
             <a:spLocks noGrp="1"/>
           </p:cNvSpPr>
           <p:nvPr>
-            <p:ph type="dt" idx="1"/>
+            <p:ph type="ftr" idx="1"/>
           </p:nvPr>
         </p:nvSpPr>
         <p:spPr>
           <a:xfrm>
-            <a:off x="457200" y="6356520"/>
-            <a:ext cx="2133360" cy="364680"/>
+            <a:off x="3124080" y="6356520"/>
+            <a:ext cx="2894760" cy="364320"/>
           </a:xfrm>
           <a:prstGeom prst="rect">
             <a:avLst/>
@@ -2440,40 +2356,34 @@
           </a:ln>
         </p:spPr>
         <p:txBody>
-          <a:bodyPr anchor="ctr">
+          <a:bodyPr lIns="90000" rIns="90000" tIns="45000" bIns="45000" anchor="ctr">
             <a:noAutofit/>
           </a:bodyPr>
           <a:lstStyle>
-            <a:lvl1pPr>
+            <a:lvl1pPr algn="ctr">
               <a:lnSpc>
                 <a:spcPct val="100000"/>
               </a:lnSpc>
               <a:buNone/>
-              <a:defRPr b="0" lang="en-US" sz="1200" spc="-1" strike="noStrike">
-                <a:solidFill>
-                  <a:srgbClr val="8b8b8b"/>
-                </a:solidFill>
-                <a:latin typeface="Calibri"/>
+              <a:defRPr b="0" lang="en-US" sz="1400" spc="-1" strike="noStrike">
+                <a:latin typeface="Times New Roman"/>
               </a:defRPr>
             </a:lvl1pPr>
           </a:lstStyle>
           <a:p>
-            <a:pPr>
+            <a:pPr algn="ctr">
               <a:lnSpc>
                 <a:spcPct val="100000"/>
               </a:lnSpc>
               <a:buNone/>
             </a:pPr>
             <a:r>
-              <a:rPr b="0" lang="en-US" sz="1200" spc="-1" strike="noStrike">
-                <a:solidFill>
-                  <a:srgbClr val="8b8b8b"/>
-                </a:solidFill>
-                <a:latin typeface="Calibri"/>
+              <a:rPr b="0" lang="en-US" sz="1400" spc="-1" strike="noStrike">
+                <a:latin typeface="Times New Roman"/>
               </a:rPr>
-              <a:t>&lt;date/time&gt;</a:t>
+              <a:t> </a:t>
             </a:r>
-            <a:endParaRPr b="0" lang="en-US" sz="1200" spc="-1" strike="noStrike">
+            <a:endParaRPr b="0" lang="en-US" sz="1400" spc="-1" strike="noStrike">
               <a:latin typeface="Times New Roman"/>
             </a:endParaRPr>
           </a:p>
@@ -2486,13 +2396,13 @@
             <a:spLocks noGrp="1"/>
           </p:cNvSpPr>
           <p:nvPr>
-            <p:ph type="ftr" idx="2"/>
+            <p:ph type="sldNum" idx="2"/>
           </p:nvPr>
         </p:nvSpPr>
         <p:spPr>
           <a:xfrm>
-            <a:off x="3124080" y="6356520"/>
-            <a:ext cx="2895120" cy="364680"/>
+            <a:off x="6553080" y="6356520"/>
+            <a:ext cx="2133000" cy="364320"/>
           </a:xfrm>
           <a:prstGeom prst="rect">
             <a:avLst/>
@@ -2503,58 +2413,7 @@
           </a:ln>
         </p:spPr>
         <p:txBody>
-          <a:bodyPr anchor="ctr">
-            <a:noAutofit/>
-          </a:bodyPr>
-          <a:lstStyle>
-            <a:lvl1pPr algn="ctr">
-              <a:buNone/>
-              <a:defRPr b="0" lang="en-US" sz="1400" spc="-1" strike="noStrike">
-                <a:latin typeface="Times New Roman"/>
-              </a:defRPr>
-            </a:lvl1pPr>
-          </a:lstStyle>
-          <a:p>
-            <a:pPr algn="ctr">
-              <a:buNone/>
-            </a:pPr>
-            <a:r>
-              <a:rPr b="0" lang="en-US" sz="1400" spc="-1" strike="noStrike">
-                <a:latin typeface="Times New Roman"/>
-              </a:rPr>
-              <a:t>&lt;footer&gt;</a:t>
-            </a:r>
-            <a:endParaRPr b="0" lang="en-US" sz="1400" spc="-1" strike="noStrike">
-              <a:latin typeface="Times New Roman"/>
-            </a:endParaRPr>
-          </a:p>
-        </p:txBody>
-      </p:sp>
-      <p:sp>
-        <p:nvSpPr>
-          <p:cNvPr id="3" name="PlaceHolder 4"/>
-          <p:cNvSpPr>
-            <a:spLocks noGrp="1"/>
-          </p:cNvSpPr>
-          <p:nvPr>
-            <p:ph type="sldNum" idx="3"/>
-          </p:nvPr>
-        </p:nvSpPr>
-        <p:spPr>
-          <a:xfrm>
-            <a:off x="6553080" y="6356520"/>
-            <a:ext cx="2133360" cy="364680"/>
-          </a:xfrm>
-          <a:prstGeom prst="rect">
-            <a:avLst/>
-          </a:prstGeom>
-          <a:noFill/>
-          <a:ln w="0">
-            <a:noFill/>
-          </a:ln>
-        </p:spPr>
-        <p:txBody>
-          <a:bodyPr anchor="ctr">
+          <a:bodyPr lIns="90000" rIns="90000" tIns="45000" bIns="45000" anchor="ctr">
             <a:noAutofit/>
           </a:bodyPr>
           <a:lstStyle>
@@ -2578,14 +2437,14 @@
               </a:lnSpc>
               <a:buNone/>
             </a:pPr>
-            <a:fld id="{277B170E-571B-4AE5-A398-772EF5606A56}" type="slidenum">
+            <a:fld id="{1DD37A50-51E9-4404-AE06-9DB00ABEF7E1}" type="slidenum">
               <a:rPr b="0" lang="en-US" sz="1200" spc="-1" strike="noStrike">
                 <a:solidFill>
                   <a:srgbClr val="8b8b8b"/>
                 </a:solidFill>
                 <a:latin typeface="Calibri"/>
               </a:rPr>
-              <a:t>&lt;number&gt;</a:t>
+              <a:t>1</a:t>
             </a:fld>
             <a:endParaRPr b="0" lang="en-US" sz="1200" spc="-1" strike="noStrike">
               <a:latin typeface="Times New Roman"/>
@@ -2595,18 +2454,18 @@
       </p:sp>
       <p:sp>
         <p:nvSpPr>
-          <p:cNvPr id="4" name="PlaceHolder 5"/>
-          <p:cNvSpPr>
-            <a:spLocks noGrp="1"/>
-          </p:cNvSpPr>
-          <p:nvPr>
-            <p:ph type="body"/>
+          <p:cNvPr id="3" name="PlaceHolder 4"/>
+          <p:cNvSpPr>
+            <a:spLocks noGrp="1"/>
+          </p:cNvSpPr>
+          <p:nvPr>
+            <p:ph type="dt" idx="3"/>
           </p:nvPr>
         </p:nvSpPr>
         <p:spPr>
           <a:xfrm>
-            <a:off x="457200" y="1604520"/>
-            <a:ext cx="8229240" cy="3977280"/>
+            <a:off x="457200" y="6356520"/>
+            <a:ext cx="2133000" cy="364320"/>
           </a:xfrm>
           <a:prstGeom prst="rect">
             <a:avLst/>
@@ -2617,203 +2476,25 @@
           </a:ln>
         </p:spPr>
         <p:txBody>
-          <a:bodyPr lIns="0" rIns="0" tIns="0" bIns="0" anchor="t">
-            <a:normAutofit/>
+          <a:bodyPr lIns="90000" rIns="90000" tIns="45000" bIns="45000" anchor="ctr">
+            <a:noAutofit/>
           </a:bodyPr>
-          <a:p>
-            <a:pPr marL="432000" indent="-324000">
-              <a:spcBef>
-                <a:spcPts val="1417"/>
-              </a:spcBef>
-              <a:buClr>
-                <a:srgbClr val="000000"/>
-              </a:buClr>
-              <a:buSzPct val="45000"/>
-              <a:buFont typeface="Wingdings" charset="2"/>
-              <a:buChar char=""/>
-            </a:pPr>
+          <a:lstStyle>
+            <a:lvl1pPr>
+              <a:defRPr b="0" lang="en-US" sz="1400" spc="-1" strike="noStrike">
+                <a:latin typeface="Times New Roman"/>
+              </a:defRPr>
+            </a:lvl1pPr>
+          </a:lstStyle>
+          <a:p>
             <a:r>
-              <a:rPr b="0" lang="en-US" sz="3200" spc="-1" strike="noStrike">
-                <a:solidFill>
-                  <a:srgbClr val="000000"/>
-                </a:solidFill>
-                <a:latin typeface="Calibri"/>
+              <a:rPr b="0" lang="en-US" sz="1400" spc="-1" strike="noStrike">
+                <a:latin typeface="Times New Roman"/>
               </a:rPr>
-              <a:t>Click to edit the outline text format</a:t>
+              <a:t> </a:t>
             </a:r>
-            <a:endParaRPr b="0" lang="en-US" sz="3200" spc="-1" strike="noStrike">
-              <a:solidFill>
-                <a:srgbClr val="000000"/>
-              </a:solidFill>
-              <a:latin typeface="Calibri"/>
-            </a:endParaRPr>
-          </a:p>
-          <a:p>
-            <a:pPr lvl="1" marL="864000" indent="-324000">
-              <a:spcBef>
-                <a:spcPts val="1134"/>
-              </a:spcBef>
-              <a:buClr>
-                <a:srgbClr val="000000"/>
-              </a:buClr>
-              <a:buSzPct val="75000"/>
-              <a:buFont typeface="Symbol" charset="2"/>
-              <a:buChar char=""/>
-            </a:pPr>
-            <a:r>
-              <a:rPr b="0" lang="en-US" sz="2400" spc="-1" strike="noStrike">
-                <a:solidFill>
-                  <a:srgbClr val="000000"/>
-                </a:solidFill>
-                <a:latin typeface="Calibri"/>
-              </a:rPr>
-              <a:t>Second Outline Level</a:t>
-            </a:r>
-            <a:endParaRPr b="0" lang="en-US" sz="2400" spc="-1" strike="noStrike">
-              <a:solidFill>
-                <a:srgbClr val="000000"/>
-              </a:solidFill>
-              <a:latin typeface="Calibri"/>
-            </a:endParaRPr>
-          </a:p>
-          <a:p>
-            <a:pPr lvl="2" marL="1296000" indent="-288000">
-              <a:spcBef>
-                <a:spcPts val="850"/>
-              </a:spcBef>
-              <a:buClr>
-                <a:srgbClr val="000000"/>
-              </a:buClr>
-              <a:buSzPct val="45000"/>
-              <a:buFont typeface="Wingdings" charset="2"/>
-              <a:buChar char=""/>
-            </a:pPr>
-            <a:r>
-              <a:rPr b="0" lang="en-US" sz="2000" spc="-1" strike="noStrike">
-                <a:solidFill>
-                  <a:srgbClr val="000000"/>
-                </a:solidFill>
-                <a:latin typeface="Calibri"/>
-              </a:rPr>
-              <a:t>Third Outline Level</a:t>
-            </a:r>
-            <a:endParaRPr b="0" lang="en-US" sz="2000" spc="-1" strike="noStrike">
-              <a:solidFill>
-                <a:srgbClr val="000000"/>
-              </a:solidFill>
-              <a:latin typeface="Calibri"/>
-            </a:endParaRPr>
-          </a:p>
-          <a:p>
-            <a:pPr lvl="3" marL="1728000" indent="-216000">
-              <a:spcBef>
-                <a:spcPts val="567"/>
-              </a:spcBef>
-              <a:buClr>
-                <a:srgbClr val="000000"/>
-              </a:buClr>
-              <a:buSzPct val="75000"/>
-              <a:buFont typeface="Symbol" charset="2"/>
-              <a:buChar char=""/>
-            </a:pPr>
-            <a:r>
-              <a:rPr b="0" lang="en-US" sz="2000" spc="-1" strike="noStrike">
-                <a:solidFill>
-                  <a:srgbClr val="000000"/>
-                </a:solidFill>
-                <a:latin typeface="Calibri"/>
-              </a:rPr>
-              <a:t>Fourth Outline Level</a:t>
-            </a:r>
-            <a:endParaRPr b="0" lang="en-US" sz="2000" spc="-1" strike="noStrike">
-              <a:solidFill>
-                <a:srgbClr val="000000"/>
-              </a:solidFill>
-              <a:latin typeface="Calibri"/>
-            </a:endParaRPr>
-          </a:p>
-          <a:p>
-            <a:pPr lvl="4" marL="2160000" indent="-216000">
-              <a:spcBef>
-                <a:spcPts val="283"/>
-              </a:spcBef>
-              <a:buClr>
-                <a:srgbClr val="000000"/>
-              </a:buClr>
-              <a:buSzPct val="45000"/>
-              <a:buFont typeface="Wingdings" charset="2"/>
-              <a:buChar char=""/>
-            </a:pPr>
-            <a:r>
-              <a:rPr b="0" lang="en-US" sz="2000" spc="-1" strike="noStrike">
-                <a:solidFill>
-                  <a:srgbClr val="000000"/>
-                </a:solidFill>
-                <a:latin typeface="Calibri"/>
-              </a:rPr>
-              <a:t>Fifth Outline Level</a:t>
-            </a:r>
-            <a:endParaRPr b="0" lang="en-US" sz="2000" spc="-1" strike="noStrike">
-              <a:solidFill>
-                <a:srgbClr val="000000"/>
-              </a:solidFill>
-              <a:latin typeface="Calibri"/>
-            </a:endParaRPr>
-          </a:p>
-          <a:p>
-            <a:pPr lvl="5" marL="2592000" indent="-216000">
-              <a:spcBef>
-                <a:spcPts val="283"/>
-              </a:spcBef>
-              <a:buClr>
-                <a:srgbClr val="000000"/>
-              </a:buClr>
-              <a:buSzPct val="45000"/>
-              <a:buFont typeface="Wingdings" charset="2"/>
-              <a:buChar char=""/>
-            </a:pPr>
-            <a:r>
-              <a:rPr b="0" lang="en-US" sz="2000" spc="-1" strike="noStrike">
-                <a:solidFill>
-                  <a:srgbClr val="000000"/>
-                </a:solidFill>
-                <a:latin typeface="Calibri"/>
-              </a:rPr>
-              <a:t>Sixth Outline Level</a:t>
-            </a:r>
-            <a:endParaRPr b="0" lang="en-US" sz="2000" spc="-1" strike="noStrike">
-              <a:solidFill>
-                <a:srgbClr val="000000"/>
-              </a:solidFill>
-              <a:latin typeface="Calibri"/>
-            </a:endParaRPr>
-          </a:p>
-          <a:p>
-            <a:pPr lvl="6" marL="3024000" indent="-216000">
-              <a:spcBef>
-                <a:spcPts val="283"/>
-              </a:spcBef>
-              <a:buClr>
-                <a:srgbClr val="000000"/>
-              </a:buClr>
-              <a:buSzPct val="45000"/>
-              <a:buFont typeface="Wingdings" charset="2"/>
-              <a:buChar char=""/>
-            </a:pPr>
-            <a:r>
-              <a:rPr b="0" lang="en-US" sz="2000" spc="-1" strike="noStrike">
-                <a:solidFill>
-                  <a:srgbClr val="000000"/>
-                </a:solidFill>
-                <a:latin typeface="Calibri"/>
-              </a:rPr>
-              <a:t>Seventh Outline Level</a:t>
-            </a:r>
-            <a:endParaRPr b="0" lang="en-US" sz="2000" spc="-1" strike="noStrike">
-              <a:solidFill>
-                <a:srgbClr val="000000"/>
-              </a:solidFill>
-              <a:latin typeface="Calibri"/>
+            <a:endParaRPr b="0" lang="en-US" sz="1400" spc="-1" strike="noStrike">
+              <a:latin typeface="Times New Roman"/>
             </a:endParaRPr>
           </a:p>
         </p:txBody>
@@ -2857,7 +2538,7 @@
       </p:grpSpPr>
       <p:sp>
         <p:nvSpPr>
-          <p:cNvPr id="41" name="PlaceHolder 1"/>
+          <p:cNvPr id="40" name="PlaceHolder 1"/>
           <p:cNvSpPr>
             <a:spLocks noGrp="1"/>
           </p:cNvSpPr>
@@ -2868,7 +2549,7 @@
         <p:spPr>
           <a:xfrm>
             <a:off x="685800" y="2130480"/>
-            <a:ext cx="7772040" cy="1469520"/>
+            <a:ext cx="7771680" cy="1469160"/>
           </a:xfrm>
           <a:prstGeom prst="rect">
             <a:avLst/>
@@ -2879,22 +2560,22 @@
           </a:ln>
         </p:spPr>
         <p:txBody>
-          <a:bodyPr anchor="ctr">
+          <a:bodyPr lIns="0" rIns="0" tIns="0" bIns="0" anchor="ctr">
             <a:noAutofit/>
           </a:bodyPr>
           <a:p>
-            <a:endParaRPr b="0" lang="en-US" sz="1800" spc="-1" strike="noStrike">
-              <a:solidFill>
-                <a:srgbClr val="000000"/>
-              </a:solidFill>
-              <a:latin typeface="Calibri"/>
+            <a:pPr algn="ctr">
+              <a:buNone/>
+            </a:pPr>
+            <a:endParaRPr b="0" lang="en-US" sz="4400" spc="-1" strike="noStrike">
+              <a:latin typeface="Arial"/>
             </a:endParaRPr>
           </a:p>
         </p:txBody>
       </p:sp>
       <p:sp>
         <p:nvSpPr>
-          <p:cNvPr id="42" name="PlaceHolder 2"/>
+          <p:cNvPr id="41" name="PlaceHolder 2"/>
           <p:cNvSpPr>
             <a:spLocks noGrp="1"/>
           </p:cNvSpPr>
@@ -2905,7 +2586,7 @@
         <p:spPr>
           <a:xfrm>
             <a:off x="1371600" y="3886200"/>
-            <a:ext cx="6400440" cy="1752120"/>
+            <a:ext cx="6400080" cy="1751760"/>
           </a:xfrm>
           <a:prstGeom prst="rect">
             <a:avLst/>
@@ -2916,7 +2597,7 @@
           </a:ln>
         </p:spPr>
         <p:txBody>
-          <a:bodyPr anchor="t">
+          <a:bodyPr lIns="0" rIns="0" tIns="0" bIns="0" anchor="t">
             <a:noAutofit/>
           </a:bodyPr>
           <a:p>
@@ -2931,14 +2612,14 @@
       </p:sp>
       <p:sp>
         <p:nvSpPr>
-          <p:cNvPr id="43" name="TextBox 3"/>
+          <p:cNvPr id="42" name="TextBox 3"/>
           <p:cNvSpPr/>
           <p:nvPr/>
         </p:nvSpPr>
         <p:spPr>
           <a:xfrm>
             <a:off x="1752480" y="0"/>
-            <a:ext cx="5638320" cy="545760"/>
+            <a:ext cx="5637960" cy="546480"/>
           </a:xfrm>
           <a:prstGeom prst="rect">
             <a:avLst/>
@@ -2982,6 +2663,7 @@
                   <a:srgbClr val="000000"/>
                 </a:solidFill>
                 <a:latin typeface="Calibri"/>
+                <a:ea typeface="DejaVu Sans"/>
               </a:rPr>
               <a:t>Carnoustie Regulatory status summary</a:t>
             </a:r>
@@ -2993,13 +2675,13 @@
       </p:sp>
       <p:graphicFrame>
         <p:nvGraphicFramePr>
-          <p:cNvPr id="44" name="Table 4"/>
+          <p:cNvPr id="43" name="Table 4"/>
           <p:cNvGraphicFramePr/>
           <p:nvPr/>
         </p:nvGraphicFramePr>
         <p:xfrm>
           <a:off x="182880" y="576000"/>
-          <a:ext cx="3885840" cy="914040"/>
+          <a:ext cx="3885480" cy="914040"/>
         </p:xfrm>
         <a:graphic>
           <a:graphicData uri="http://schemas.openxmlformats.org/drawingml/2006/table">
@@ -3011,10 +2693,6 @@
               </a:tblGrid>
               <a:tr h="457200">
                 <a:tc>
-                  <a:txBody>
-                    <a:bodyPr/>
-                    <a:p/>
-                  </a:txBody>
                   <a:tcPr anchor="ctr" marL="91440" marR="91440">
                     <a:lnL w="12240">
                       <a:solidFill>
@@ -3180,13 +2858,22 @@
                         <a:buNone/>
                       </a:pPr>
                       <a:r>
+                        <a:rPr b="0" lang="en-US" sz="800" spc="-1" strike="dblStrike">
+                          <a:solidFill>
+                            <a:srgbClr val="000000"/>
+                          </a:solidFill>
+                          <a:latin typeface="Calibri"/>
+                        </a:rPr>
+                        <a:t>Mexico(IFETEL)</a:t>
+                      </a:r>
+                      <a:r>
                         <a:rPr b="0" lang="en-US" sz="800" spc="-1" strike="noStrike">
                           <a:solidFill>
                             <a:srgbClr val="000000"/>
                           </a:solidFill>
                           <a:latin typeface="Calibri"/>
                         </a:rPr>
-                        <a:t>Mexico(IFETEL),Jordan(TRC (RTN))</a:t>
+                        <a:t>,Jordan(TRC (RTN))</a:t>
                       </a:r>
                       <a:endParaRPr b="0" lang="en-US" sz="800" spc="-1" strike="noStrike">
                         <a:latin typeface="Arial"/>
@@ -3298,14 +2985,13 @@
                         <a:t>,</a:t>
                       </a:r>
                       <a:r>
-                        <a:rPr b="0" lang="en-US" sz="800" spc="-1" strike="dblStrike">
+                        <a:rPr b="0" lang="en-US" sz="800" spc="-1" strike="noStrike">
                           <a:solidFill>
                             <a:srgbClr val="000000"/>
                           </a:solidFill>
                           <a:latin typeface="Calibri"/>
                         </a:rPr>
                         <a:t>Philippines(NTC)</a:t>
-                        <a:rPr strike="dblStrike"/>
                       </a:r>
                       <a:endParaRPr b="0" lang="en-US" sz="800" spc="-1" strike="noStrike">
                         <a:latin typeface="Arial"/>
@@ -3405,7 +3091,7 @@
                           </a:solidFill>
                           <a:latin typeface="Calibri"/>
                         </a:rPr>
-                        <a:t>,</a:t>
+                        <a:t>,Serbia(Kvatet),</a:t>
                       </a:r>
                       <a:r>
                         <a:rPr b="0" lang="en-US" sz="800" spc="-1" strike="dblStrike">
@@ -3414,17 +3100,7 @@
                           </a:solidFill>
                           <a:latin typeface="Calibri"/>
                         </a:rPr>
-                        <a:t>Serbia(Kvatet)</a:t>
-                        <a:rPr strike="dblStrike"/>
-                      </a:r>
-                      <a:r>
-                        <a:rPr b="0" lang="en-US" sz="800" spc="-1" strike="noStrike">
-                          <a:solidFill>
-                            <a:srgbClr val="000000"/>
-                          </a:solidFill>
-                          <a:latin typeface="Calibri"/>
-                        </a:rPr>
-                        <a:t>,Moldova(INSM)</a:t>
+                        <a:t>Moldova(INSM)</a:t>
                       </a:r>
                       <a:endParaRPr b="0" lang="en-US" sz="800" spc="-1" strike="noStrike">
                         <a:latin typeface="Arial"/>
@@ -3495,13 +3171,13 @@
       </p:graphicFrame>
       <p:graphicFrame>
         <p:nvGraphicFramePr>
-          <p:cNvPr id="45" name="Table 5"/>
+          <p:cNvPr id="44" name="Table 5"/>
           <p:cNvGraphicFramePr/>
           <p:nvPr/>
         </p:nvGraphicFramePr>
         <p:xfrm>
           <a:off x="182880" y="3931920"/>
-          <a:ext cx="3885840" cy="914040"/>
+          <a:ext cx="3885480" cy="2434680"/>
         </p:xfrm>
         <a:graphic>
           <a:graphicData uri="http://schemas.openxmlformats.org/drawingml/2006/table">
@@ -4092,13 +3768,13 @@
       </p:graphicFrame>
       <p:graphicFrame>
         <p:nvGraphicFramePr>
-          <p:cNvPr id="46" name="Table 6"/>
+          <p:cNvPr id="45" name="Table 6"/>
           <p:cNvGraphicFramePr/>
           <p:nvPr/>
         </p:nvGraphicFramePr>
         <p:xfrm>
           <a:off x="7205400" y="45720"/>
-          <a:ext cx="1830600" cy="914040"/>
+          <a:ext cx="1830240" cy="913680"/>
         </p:xfrm>
         <a:graphic>
           <a:graphicData uri="http://schemas.openxmlformats.org/drawingml/2006/table">

</xml_diff>